<commit_message>
Experiment using universal quantifier in ms power point.
SVN-Revision: 61683
</commit_message>
<xml_diff>
--- a/itl/libs/validate/doc/boostcon2010/BoostAlabaster.pptx
+++ b/itl/libs/validate/doc/boostcon2010/BoostAlabaster.pptx
@@ -187,7 +187,7 @@
         <c:manualLayout>
           <c:xMode val="edge"/>
           <c:yMode val="edge"/>
-          <c:x val="0.37602229865024023"/>
+          <c:x val="0.37602229865024039"/>
           <c:y val="2.9411764705882356E-2"/>
         </c:manualLayout>
       </c:layout>
@@ -204,10 +204,10 @@
           <c:layoutTarget val="inner"/>
           <c:xMode val="edge"/>
           <c:yMode val="edge"/>
-          <c:x val="0.19618554712186437"/>
-          <c:y val="0.14075630252100854"/>
-          <c:w val="0.73569580170699145"/>
-          <c:h val="0.67016806722689126"/>
+          <c:x val="0.19618554712186442"/>
+          <c:y val="0.14075630252100857"/>
+          <c:w val="0.73569580170699156"/>
+          <c:h val="0.67016806722689148"/>
         </c:manualLayout>
       </c:layout>
       <c:scatterChart>
@@ -420,11 +420,11 @@
             </c:numRef>
           </c:yVal>
         </c:ser>
-        <c:axId val="61616512"/>
-        <c:axId val="61618816"/>
+        <c:axId val="84382080"/>
+        <c:axId val="84384384"/>
       </c:scatterChart>
       <c:valAx>
-        <c:axId val="61616512"/>
+        <c:axId val="84382080"/>
         <c:scaling>
           <c:orientation val="minMax"/>
           <c:max val="212"/>
@@ -459,7 +459,7 @@
               <c:xMode val="edge"/>
               <c:yMode val="edge"/>
               <c:x val="0.45504147735210182"/>
-              <c:y val="0.86764705882353055"/>
+              <c:y val="0.86764705882353077"/>
             </c:manualLayout>
           </c:layout>
           <c:spPr>
@@ -496,12 +496,12 @@
             <a:endParaRPr lang="de-DE"/>
           </a:p>
         </c:txPr>
-        <c:crossAx val="61618816"/>
+        <c:crossAx val="84384384"/>
         <c:crosses val="autoZero"/>
         <c:crossBetween val="midCat"/>
       </c:valAx>
       <c:valAx>
-        <c:axId val="61618816"/>
+        <c:axId val="84384384"/>
         <c:scaling>
           <c:orientation val="minMax"/>
           <c:max val="1000"/>
@@ -544,8 +544,8 @@
             <c:manualLayout>
               <c:xMode val="edge"/>
               <c:yMode val="edge"/>
-              <c:x val="4.3596788249303235E-2"/>
-              <c:y val="0.36344537815126077"/>
+              <c:x val="4.3596788249303256E-2"/>
+              <c:y val="0.36344537815126082"/>
             </c:manualLayout>
           </c:layout>
           <c:spPr>
@@ -582,7 +582,7 @@
             <a:endParaRPr lang="de-DE"/>
           </a:p>
         </c:txPr>
-        <c:crossAx val="61616512"/>
+        <c:crossAx val="84382080"/>
         <c:crosses val="autoZero"/>
         <c:crossBetween val="midCat"/>
       </c:valAx>
@@ -604,9 +604,9 @@
         <c:manualLayout>
           <c:xMode val="edge"/>
           <c:yMode val="edge"/>
-          <c:x val="0.34059990819768143"/>
-          <c:y val="0.93907563025210172"/>
-          <c:w val="0.44414228028977643"/>
+          <c:x val="0.34059990819768154"/>
+          <c:y val="0.93907563025210183"/>
+          <c:w val="0.44414228028977654"/>
           <c:h val="4.6218487394957986E-2"/>
         </c:manualLayout>
       </c:layout>
@@ -6962,7 +6962,7 @@
     <p:bg>
       <p:bgPr>
         <a:blipFill dpi="0" rotWithShape="1">
-          <a:blip r:embed="rId2">
+          <a:blip r:embed="rId2" cstate="print">
             <a:lum/>
           </a:blip>
           <a:srcRect/>
@@ -18607,7 +18607,7 @@
     <p:bg>
       <p:bgPr>
         <a:blipFill dpi="0" rotWithShape="1">
-          <a:blip r:embed="rId2">
+          <a:blip r:embed="rId2" cstate="print">
             <a:alphaModFix amt="50000"/>
             <a:lum/>
           </a:blip>
@@ -28398,7 +28398,7 @@
     <p:bg>
       <p:bgPr>
         <a:blipFill dpi="0" rotWithShape="1">
-          <a:blip r:embed="rId2">
+          <a:blip r:embed="rId2" cstate="print">
             <a:alphaModFix amt="50000"/>
             <a:lum/>
           </a:blip>
@@ -31827,15 +31827,19 @@
               <a:rPr lang="en-US" dirty="0" smtClean="0"/>
               <a:t>Comparing two implementations of a function</a:t>
             </a:r>
+            <a:r>
+              <a:rPr lang="en-US" smtClean="0"/>
+              <a:t/>
+            </a:r>
             <a:br>
-              <a:rPr lang="en-US" dirty="0" smtClean="0"/>
+              <a:rPr lang="en-US" smtClean="0"/>
             </a:br>
             <a:r>
-              <a:rPr lang="en-US" dirty="0" smtClean="0">
+              <a:rPr lang="en-US" smtClean="0">
                 <a:latin typeface="Cambria Math" pitchFamily="18" charset="0"/>
                 <a:ea typeface="Cambria Math" pitchFamily="18" charset="0"/>
               </a:rPr>
-              <a:t>⩝ </a:t>
+              <a:t>∀ </a:t>
             </a:r>
             <a:r>
               <a:rPr lang="en-US" i="1" dirty="0" smtClean="0">
@@ -33084,11 +33088,7 @@
             </a:r>
             <a:r>
               <a:rPr lang="en-US" sz="2300" dirty="0" smtClean="0"/>
-              <a:t> </a:t>
-            </a:r>
-            <a:r>
-              <a:rPr lang="en-US" sz="2300" dirty="0" smtClean="0"/>
-              <a:t>that transforms </a:t>
+              <a:t> that transforms </a:t>
             </a:r>
             <a:r>
               <a:rPr lang="en-US" sz="2300" i="1" dirty="0" smtClean="0">
@@ -37434,7 +37434,7 @@
     <p:bg>
       <p:bgPr>
         <a:blipFill dpi="0" rotWithShape="1">
-          <a:blip r:embed="rId2">
+          <a:blip r:embed="rId2" cstate="print">
             <a:alphaModFix amt="50000"/>
             <a:lum/>
           </a:blip>
@@ -38369,15 +38369,7 @@
             <a:pPr lvl="1"/>
             <a:r>
               <a:rPr lang="en-US" dirty="0" smtClean="0"/>
-              <a:t>Could </a:t>
-            </a:r>
-            <a:r>
-              <a:rPr lang="en-US" dirty="0" smtClean="0"/>
-              <a:t>be of </a:t>
-            </a:r>
-            <a:r>
-              <a:rPr lang="en-US" dirty="0" smtClean="0"/>
-              <a:t>value for all kinds of mocking tools and Monte Carlo studies.</a:t>
+              <a:t>Could be of value for all kinds of mocking tools and Monte Carlo studies.</a:t>
             </a:r>
           </a:p>
           <a:p>
@@ -38412,13 +38404,8 @@
             </a:r>
             <a:r>
               <a:rPr lang="en-US" dirty="0" smtClean="0"/>
-              <a:t> formulae, commuting diagrams </a:t>
-            </a:r>
-            <a:r>
-              <a:rPr lang="en-US" dirty="0" smtClean="0"/>
-              <a:t>. . .  </a:t>
-            </a:r>
-            <a:endParaRPr lang="en-US" dirty="0" smtClean="0"/>
+              <a:t> formulae, commuting diagrams . . .  </a:t>
+            </a:r>
           </a:p>
           <a:p>
             <a:r>
@@ -38529,11 +38516,7 @@
           <a:p>
             <a:r>
               <a:rPr lang="en-US" dirty="0" smtClean="0"/>
-              <a:t>Transforms testing into </a:t>
-            </a:r>
-            <a:r>
-              <a:rPr lang="en-US" dirty="0" smtClean="0"/>
-              <a:t>development</a:t>
+              <a:t>Transforms testing into development</a:t>
             </a:r>
           </a:p>
           <a:p>
@@ -38589,7 +38572,7 @@
     <p:bg>
       <p:bgPr>
         <a:blipFill dpi="0" rotWithShape="1">
-          <a:blip r:embed="rId2">
+          <a:blip r:embed="rId2" cstate="print">
             <a:lum/>
           </a:blip>
           <a:srcRect/>
@@ -39019,7 +39002,7 @@
     <p:bg>
       <p:bgPr>
         <a:blipFill dpi="0" rotWithShape="1">
-          <a:blip r:embed="rId2">
+          <a:blip r:embed="rId2" cstate="print">
             <a:alphaModFix amt="50000"/>
             <a:lum/>
           </a:blip>
@@ -39717,7 +39700,7 @@
           <p:nvPr/>
         </p:nvPicPr>
         <p:blipFill>
-          <a:blip r:embed="rId2"/>
+          <a:blip r:embed="rId2" cstate="print"/>
           <a:stretch>
             <a:fillRect/>
           </a:stretch>
@@ -40407,7 +40390,7 @@
           <p:nvPr/>
         </p:nvPicPr>
         <p:blipFill>
-          <a:blip r:embed="rId2"/>
+          <a:blip r:embed="rId2" cstate="print"/>
           <a:stretch>
             <a:fillRect/>
           </a:stretch>

</xml_diff>

<commit_message>
Modified presentation Boost.Alabaster. Minor code changes.
SVN-Revision: 61909
</commit_message>
<xml_diff>
--- a/itl/libs/validate/doc/boostcon2010/BoostAlabaster.pptx
+++ b/itl/libs/validate/doc/boostcon2010/BoostAlabaster.pptx
@@ -39036,9 +39036,36 @@
           </a:bodyPr>
           <a:lstStyle/>
           <a:p>
+            <a:pPr algn="ctr">
+              <a:buNone/>
+            </a:pPr>
             <a:r>
               <a:rPr lang="en-US" sz="2800" dirty="0" smtClean="0"/>
-              <a:t>A remedy for the review manager starvation.</a:t>
+              <a:t>A Remedy for </a:t>
+            </a:r>
+            <a:r>
+              <a:rPr lang="en-US" sz="2800" smtClean="0"/>
+              <a:t>the Review </a:t>
+            </a:r>
+            <a:r>
+              <a:rPr lang="en-US" sz="2800" smtClean="0"/>
+              <a:t>M</a:t>
+            </a:r>
+            <a:r>
+              <a:rPr lang="en-US" sz="2800" smtClean="0"/>
+              <a:t>anager </a:t>
+            </a:r>
+            <a:r>
+              <a:rPr lang="en-US" sz="2800" dirty="0" smtClean="0"/>
+              <a:t>S</a:t>
+            </a:r>
+            <a:r>
+              <a:rPr lang="en-US" sz="2800" smtClean="0"/>
+              <a:t>tarvation</a:t>
+            </a:r>
+            <a:r>
+              <a:rPr lang="en-US" sz="2800" dirty="0" smtClean="0"/>
+              <a:t>.</a:t>
             </a:r>
             <a:endParaRPr lang="en-US" sz="2800" dirty="0"/>
           </a:p>
@@ -39809,7 +39836,19 @@
           <a:p>
             <a:r>
               <a:rPr lang="en-US" sz="2800" dirty="0" smtClean="0"/>
-              <a:t>A desire to get the approval of experts</a:t>
+              <a:t>A desire to get the </a:t>
+            </a:r>
+            <a:r>
+              <a:rPr lang="en-US" sz="2800" dirty="0" smtClean="0">
+                <a:solidFill>
+                  <a:srgbClr val="0070C0"/>
+                </a:solidFill>
+              </a:rPr>
+              <a:t>approval</a:t>
+            </a:r>
+            <a:r>
+              <a:rPr lang="en-US" sz="2800" dirty="0" smtClean="0"/>
+              <a:t> of experts</a:t>
             </a:r>
           </a:p>
           <a:p>
@@ -40910,13 +40949,8 @@
             </a:r>
             <a:r>
               <a:rPr lang="en-US" sz="2800" dirty="0" smtClean="0"/>
-              <a:t>oes all the work that is necessary to check a library submission, organize the process, moderate and file a </a:t>
-            </a:r>
-            <a:r>
-              <a:rPr lang="en-US" sz="2800" smtClean="0"/>
-              <a:t>final report.</a:t>
-            </a:r>
-            <a:endParaRPr lang="en-US" sz="2800" dirty="0" smtClean="0"/>
+              <a:t>oes all the work that is necessary to check a library submission, organize the process, moderate and file a final report.</a:t>
+            </a:r>
           </a:p>
           <a:p>
             <a:r>

</xml_diff>